<commit_message>
update ppt tambah constraint
</commit_message>
<xml_diff>
--- a/Aplikasi Pengajuan Cuti.pptx
+++ b/Aplikasi Pengajuan Cuti.pptx
@@ -37,6 +37,7 @@
     <p:sldId id="281" r:id="rId31"/>
     <p:sldId id="282" r:id="rId32"/>
     <p:sldId id="269" r:id="rId33"/>
+    <p:sldId id="288" r:id="rId34"/>
   </p:sldIdLst>
   <p:sldSz cx="12192000" cy="6858000"/>
   <p:notesSz cx="6858000" cy="9144000"/>
@@ -8185,6 +8186,1196 @@
 </p:sld>
 </file>
 
+<file path=ppt/slides/slide33.xml><?xml version="1.0" encoding="utf-8"?>
+<p:sld xmlns:a="http://schemas.openxmlformats.org/drawingml/2006/main" xmlns:r="http://schemas.openxmlformats.org/officeDocument/2006/relationships" xmlns:p="http://schemas.openxmlformats.org/presentationml/2006/main">
+  <p:cSld>
+    <p:spTree>
+      <p:nvGrpSpPr>
+        <p:cNvPr id="1" name=""/>
+        <p:cNvGrpSpPr/>
+        <p:nvPr/>
+      </p:nvGrpSpPr>
+      <p:grpSpPr>
+        <a:xfrm>
+          <a:off x="0" y="0"/>
+          <a:ext cx="0" cy="0"/>
+          <a:chOff x="0" y="0"/>
+          <a:chExt cx="0" cy="0"/>
+        </a:xfrm>
+      </p:grpSpPr>
+      <p:sp>
+        <p:nvSpPr>
+          <p:cNvPr id="2" name="Judul 1">
+            <a:extLst>
+              <a:ext uri="{FF2B5EF4-FFF2-40B4-BE49-F238E27FC236}">
+                <a16:creationId xmlns:a16="http://schemas.microsoft.com/office/drawing/2014/main" id="{4E30F33D-DE10-4BCD-A85C-1758DF1B365A}"/>
+              </a:ext>
+            </a:extLst>
+          </p:cNvPr>
+          <p:cNvSpPr>
+            <a:spLocks noGrp="1"/>
+          </p:cNvSpPr>
+          <p:nvPr>
+            <p:ph type="title"/>
+          </p:nvPr>
+        </p:nvSpPr>
+        <p:spPr>
+          <a:xfrm>
+            <a:off x="181936" y="-136184"/>
+            <a:ext cx="8534400" cy="1507067"/>
+          </a:xfrm>
+        </p:spPr>
+        <p:txBody>
+          <a:bodyPr/>
+          <a:lstStyle/>
+          <a:p>
+            <a:r>
+              <a:rPr lang="en-US" dirty="0" err="1"/>
+              <a:t>Penjelasan</a:t>
+            </a:r>
+            <a:r>
+              <a:rPr lang="en-US" dirty="0"/>
+              <a:t> constraint </a:t>
+            </a:r>
+            <a:r>
+              <a:rPr lang="en-US" dirty="0" err="1"/>
+              <a:t>ambil</a:t>
+            </a:r>
+            <a:r>
+              <a:rPr lang="en-US" dirty="0"/>
+              <a:t> </a:t>
+            </a:r>
+            <a:r>
+              <a:rPr lang="en-US" dirty="0" err="1"/>
+              <a:t>cuti</a:t>
+            </a:r>
+            <a:endParaRPr lang="en-US" dirty="0"/>
+          </a:p>
+        </p:txBody>
+      </p:sp>
+      <p:graphicFrame>
+        <p:nvGraphicFramePr>
+          <p:cNvPr id="8" name="Tampungan Konten 7">
+            <a:extLst>
+              <a:ext uri="{FF2B5EF4-FFF2-40B4-BE49-F238E27FC236}">
+                <a16:creationId xmlns:a16="http://schemas.microsoft.com/office/drawing/2014/main" id="{D3AA68C8-E121-4429-A129-1B795E2E2B55}"/>
+              </a:ext>
+            </a:extLst>
+          </p:cNvPr>
+          <p:cNvGraphicFramePr>
+            <a:graphicFrameLocks noGrp="1"/>
+          </p:cNvGraphicFramePr>
+          <p:nvPr>
+            <p:ph idx="1"/>
+            <p:extLst>
+              <p:ext uri="{D42A27DB-BD31-4B8C-83A1-F6EECF244321}">
+                <p14:modId xmlns:p14="http://schemas.microsoft.com/office/powerpoint/2010/main" val="3608819188"/>
+              </p:ext>
+            </p:extLst>
+          </p:nvPr>
+        </p:nvGraphicFramePr>
+        <p:xfrm>
+          <a:off x="452393" y="1085045"/>
+          <a:ext cx="11074199" cy="3337560"/>
+        </p:xfrm>
+        <a:graphic>
+          <a:graphicData uri="http://schemas.openxmlformats.org/drawingml/2006/table">
+            <a:tbl>
+              <a:tblPr firstRow="1" bandRow="1">
+                <a:tableStyleId>{5C22544A-7EE6-4342-B048-85BDC9FD1C3A}</a:tableStyleId>
+              </a:tblPr>
+              <a:tblGrid>
+                <a:gridCol w="1028677">
+                  <a:extLst>
+                    <a:ext uri="{9D8B030D-6E8A-4147-A177-3AD203B41FA5}">
+                      <a16:colId xmlns:a16="http://schemas.microsoft.com/office/drawing/2014/main" val="712124193"/>
+                    </a:ext>
+                  </a:extLst>
+                </a:gridCol>
+                <a:gridCol w="1223493">
+                  <a:extLst>
+                    <a:ext uri="{9D8B030D-6E8A-4147-A177-3AD203B41FA5}">
+                      <a16:colId xmlns:a16="http://schemas.microsoft.com/office/drawing/2014/main" val="290197321"/>
+                    </a:ext>
+                  </a:extLst>
+                </a:gridCol>
+                <a:gridCol w="1481071">
+                  <a:extLst>
+                    <a:ext uri="{9D8B030D-6E8A-4147-A177-3AD203B41FA5}">
+                      <a16:colId xmlns:a16="http://schemas.microsoft.com/office/drawing/2014/main" val="1600248299"/>
+                    </a:ext>
+                  </a:extLst>
+                </a:gridCol>
+                <a:gridCol w="1197735">
+                  <a:extLst>
+                    <a:ext uri="{9D8B030D-6E8A-4147-A177-3AD203B41FA5}">
+                      <a16:colId xmlns:a16="http://schemas.microsoft.com/office/drawing/2014/main" val="3618966655"/>
+                    </a:ext>
+                  </a:extLst>
+                </a:gridCol>
+                <a:gridCol w="6143223">
+                  <a:extLst>
+                    <a:ext uri="{9D8B030D-6E8A-4147-A177-3AD203B41FA5}">
+                      <a16:colId xmlns:a16="http://schemas.microsoft.com/office/drawing/2014/main" val="3040857886"/>
+                    </a:ext>
+                  </a:extLst>
+                </a:gridCol>
+              </a:tblGrid>
+              <a:tr h="370840">
+                <a:tc>
+                  <a:txBody>
+                    <a:bodyPr/>
+                    <a:lstStyle/>
+                    <a:p>
+                      <a:pPr algn="ctr"/>
+                      <a:r>
+                        <a:rPr lang="en-US" dirty="0"/>
+                        <a:t>Gender</a:t>
+                      </a:r>
+                    </a:p>
+                  </a:txBody>
+                  <a:tcPr/>
+                </a:tc>
+                <a:tc>
+                  <a:txBody>
+                    <a:bodyPr/>
+                    <a:lstStyle/>
+                    <a:p>
+                      <a:pPr algn="ctr"/>
+                      <a:r>
+                        <a:rPr lang="en-US" dirty="0"/>
+                        <a:t>Marriage</a:t>
+                      </a:r>
+                    </a:p>
+                  </a:txBody>
+                  <a:tcPr/>
+                </a:tc>
+                <a:tc>
+                  <a:txBody>
+                    <a:bodyPr/>
+                    <a:lstStyle/>
+                    <a:p>
+                      <a:pPr algn="ctr"/>
+                      <a:r>
+                        <a:rPr lang="en-US" dirty="0"/>
+                        <a:t>Religion</a:t>
+                      </a:r>
+                    </a:p>
+                  </a:txBody>
+                  <a:tcPr/>
+                </a:tc>
+                <a:tc>
+                  <a:txBody>
+                    <a:bodyPr/>
+                    <a:lstStyle/>
+                    <a:p>
+                      <a:pPr algn="ctr"/>
+                      <a:r>
+                        <a:rPr lang="en-US" dirty="0"/>
+                        <a:t>Children</a:t>
+                      </a:r>
+                    </a:p>
+                  </a:txBody>
+                  <a:tcPr/>
+                </a:tc>
+                <a:tc>
+                  <a:txBody>
+                    <a:bodyPr/>
+                    <a:lstStyle/>
+                    <a:p>
+                      <a:pPr algn="ctr"/>
+                      <a:r>
+                        <a:rPr lang="en-US" dirty="0" err="1"/>
+                        <a:t>Cuti</a:t>
+                      </a:r>
+                      <a:r>
+                        <a:rPr lang="en-US" dirty="0"/>
+                        <a:t> </a:t>
+                      </a:r>
+                      <a:r>
+                        <a:rPr lang="en-US" dirty="0" err="1"/>
+                        <a:t>tidak</a:t>
+                      </a:r>
+                      <a:r>
+                        <a:rPr lang="en-US" dirty="0"/>
+                        <a:t> </a:t>
+                      </a:r>
+                      <a:r>
+                        <a:rPr lang="en-US" dirty="0" err="1"/>
+                        <a:t>bisa</a:t>
+                      </a:r>
+                      <a:r>
+                        <a:rPr lang="en-US" dirty="0"/>
+                        <a:t> </a:t>
+                      </a:r>
+                      <a:r>
+                        <a:rPr lang="en-US" dirty="0" err="1"/>
+                        <a:t>diambil</a:t>
+                      </a:r>
+                      <a:endParaRPr lang="en-US" dirty="0"/>
+                    </a:p>
+                  </a:txBody>
+                  <a:tcPr/>
+                </a:tc>
+                <a:extLst>
+                  <a:ext uri="{0D108BD9-81ED-4DB2-BD59-A6C34878D82A}">
+                    <a16:rowId xmlns:a16="http://schemas.microsoft.com/office/drawing/2014/main" val="2888471465"/>
+                  </a:ext>
+                </a:extLst>
+              </a:tr>
+              <a:tr h="370840">
+                <a:tc>
+                  <a:txBody>
+                    <a:bodyPr/>
+                    <a:lstStyle/>
+                    <a:p>
+                      <a:r>
+                        <a:rPr lang="en-US" dirty="0"/>
+                        <a:t>F</a:t>
+                      </a:r>
+                    </a:p>
+                  </a:txBody>
+                  <a:tcPr/>
+                </a:tc>
+                <a:tc>
+                  <a:txBody>
+                    <a:bodyPr/>
+                    <a:lstStyle/>
+                    <a:p>
+                      <a:r>
+                        <a:rPr lang="en-US" dirty="0"/>
+                        <a:t>Y</a:t>
+                      </a:r>
+                    </a:p>
+                  </a:txBody>
+                  <a:tcPr/>
+                </a:tc>
+                <a:tc>
+                  <a:txBody>
+                    <a:bodyPr/>
+                    <a:lstStyle/>
+                    <a:p>
+                      <a:r>
+                        <a:rPr lang="en-US" dirty="0"/>
+                        <a:t>Islam</a:t>
+                      </a:r>
+                    </a:p>
+                  </a:txBody>
+                  <a:tcPr/>
+                </a:tc>
+                <a:tc>
+                  <a:txBody>
+                    <a:bodyPr/>
+                    <a:lstStyle/>
+                    <a:p>
+                      <a:r>
+                        <a:rPr lang="en-US" dirty="0"/>
+                        <a:t>-</a:t>
+                      </a:r>
+                    </a:p>
+                  </a:txBody>
+                  <a:tcPr/>
+                </a:tc>
+                <a:tc>
+                  <a:txBody>
+                    <a:bodyPr/>
+                    <a:lstStyle/>
+                    <a:p>
+                      <a:r>
+                        <a:rPr lang="en-US" dirty="0" err="1"/>
+                        <a:t>Cuti</a:t>
+                      </a:r>
+                      <a:r>
+                        <a:rPr lang="en-US" dirty="0"/>
+                        <a:t> </a:t>
+                      </a:r>
+                      <a:r>
+                        <a:rPr lang="en-US" dirty="0" err="1"/>
+                        <a:t>Sunat</a:t>
+                      </a:r>
+                      <a:r>
+                        <a:rPr lang="en-US" dirty="0"/>
+                        <a:t> &amp; </a:t>
+                      </a:r>
+                      <a:r>
+                        <a:rPr lang="en-US" dirty="0" err="1"/>
+                        <a:t>Cuti</a:t>
+                      </a:r>
+                      <a:r>
+                        <a:rPr lang="en-US" dirty="0"/>
+                        <a:t> </a:t>
+                      </a:r>
+                      <a:r>
+                        <a:rPr lang="en-US" dirty="0" err="1"/>
+                        <a:t>Menikah</a:t>
+                      </a:r>
+                      <a:endParaRPr lang="en-US" dirty="0"/>
+                    </a:p>
+                  </a:txBody>
+                  <a:tcPr/>
+                </a:tc>
+                <a:extLst>
+                  <a:ext uri="{0D108BD9-81ED-4DB2-BD59-A6C34878D82A}">
+                    <a16:rowId xmlns:a16="http://schemas.microsoft.com/office/drawing/2014/main" val="2682791199"/>
+                  </a:ext>
+                </a:extLst>
+              </a:tr>
+              <a:tr h="370840">
+                <a:tc>
+                  <a:txBody>
+                    <a:bodyPr/>
+                    <a:lstStyle/>
+                    <a:p>
+                      <a:r>
+                        <a:rPr lang="en-US" dirty="0"/>
+                        <a:t>F</a:t>
+                      </a:r>
+                    </a:p>
+                  </a:txBody>
+                  <a:tcPr/>
+                </a:tc>
+                <a:tc>
+                  <a:txBody>
+                    <a:bodyPr/>
+                    <a:lstStyle/>
+                    <a:p>
+                      <a:r>
+                        <a:rPr lang="en-US" dirty="0"/>
+                        <a:t>Y</a:t>
+                      </a:r>
+                    </a:p>
+                  </a:txBody>
+                  <a:tcPr/>
+                </a:tc>
+                <a:tc>
+                  <a:txBody>
+                    <a:bodyPr/>
+                    <a:lstStyle/>
+                    <a:p>
+                      <a:r>
+                        <a:rPr lang="en-US" dirty="0"/>
+                        <a:t>Non-Muslim</a:t>
+                      </a:r>
+                    </a:p>
+                  </a:txBody>
+                  <a:tcPr/>
+                </a:tc>
+                <a:tc>
+                  <a:txBody>
+                    <a:bodyPr/>
+                    <a:lstStyle/>
+                    <a:p>
+                      <a:r>
+                        <a:rPr lang="en-US" dirty="0"/>
+                        <a:t>-</a:t>
+                      </a:r>
+                    </a:p>
+                  </a:txBody>
+                  <a:tcPr/>
+                </a:tc>
+                <a:tc>
+                  <a:txBody>
+                    <a:bodyPr/>
+                    <a:lstStyle/>
+                    <a:p>
+                      <a:r>
+                        <a:rPr lang="en-US" dirty="0" err="1"/>
+                        <a:t>Cuti</a:t>
+                      </a:r>
+                      <a:r>
+                        <a:rPr lang="en-US" dirty="0"/>
+                        <a:t> </a:t>
+                      </a:r>
+                      <a:r>
+                        <a:rPr lang="en-US" dirty="0" err="1"/>
+                        <a:t>Sunat</a:t>
+                      </a:r>
+                      <a:r>
+                        <a:rPr lang="en-US" dirty="0"/>
+                        <a:t>, </a:t>
+                      </a:r>
+                      <a:r>
+                        <a:rPr lang="en-US" dirty="0" err="1"/>
+                        <a:t>Cuti</a:t>
+                      </a:r>
+                      <a:r>
+                        <a:rPr lang="en-US" dirty="0"/>
+                        <a:t> </a:t>
+                      </a:r>
+                      <a:r>
+                        <a:rPr lang="en-US" dirty="0" err="1"/>
+                        <a:t>Menikah</a:t>
+                      </a:r>
+                      <a:r>
+                        <a:rPr lang="en-US" dirty="0"/>
+                        <a:t>, </a:t>
+                      </a:r>
+                      <a:r>
+                        <a:rPr lang="en-US" dirty="0" err="1"/>
+                        <a:t>Cuti</a:t>
+                      </a:r>
+                      <a:r>
+                        <a:rPr lang="en-US" dirty="0"/>
+                        <a:t> </a:t>
+                      </a:r>
+                      <a:r>
+                        <a:rPr lang="en-US" dirty="0" err="1"/>
+                        <a:t>Umroh</a:t>
+                      </a:r>
+                      <a:r>
+                        <a:rPr lang="en-US" dirty="0"/>
+                        <a:t> &amp; </a:t>
+                      </a:r>
+                      <a:r>
+                        <a:rPr lang="en-US" dirty="0" err="1"/>
+                        <a:t>Cuti</a:t>
+                      </a:r>
+                      <a:r>
+                        <a:rPr lang="en-US" dirty="0"/>
+                        <a:t> Haji</a:t>
+                      </a:r>
+                    </a:p>
+                  </a:txBody>
+                  <a:tcPr/>
+                </a:tc>
+                <a:extLst>
+                  <a:ext uri="{0D108BD9-81ED-4DB2-BD59-A6C34878D82A}">
+                    <a16:rowId xmlns:a16="http://schemas.microsoft.com/office/drawing/2014/main" val="1993333175"/>
+                  </a:ext>
+                </a:extLst>
+              </a:tr>
+              <a:tr h="370840">
+                <a:tc>
+                  <a:txBody>
+                    <a:bodyPr/>
+                    <a:lstStyle/>
+                    <a:p>
+                      <a:r>
+                        <a:rPr lang="en-US" dirty="0"/>
+                        <a:t>F</a:t>
+                      </a:r>
+                    </a:p>
+                  </a:txBody>
+                  <a:tcPr/>
+                </a:tc>
+                <a:tc>
+                  <a:txBody>
+                    <a:bodyPr/>
+                    <a:lstStyle/>
+                    <a:p>
+                      <a:r>
+                        <a:rPr lang="en-US" dirty="0"/>
+                        <a:t>N</a:t>
+                      </a:r>
+                    </a:p>
+                  </a:txBody>
+                  <a:tcPr/>
+                </a:tc>
+                <a:tc>
+                  <a:txBody>
+                    <a:bodyPr/>
+                    <a:lstStyle/>
+                    <a:p>
+                      <a:r>
+                        <a:rPr lang="en-US" dirty="0"/>
+                        <a:t>Islam</a:t>
+                      </a:r>
+                    </a:p>
+                  </a:txBody>
+                  <a:tcPr/>
+                </a:tc>
+                <a:tc>
+                  <a:txBody>
+                    <a:bodyPr/>
+                    <a:lstStyle/>
+                    <a:p>
+                      <a:r>
+                        <a:rPr lang="en-US" dirty="0"/>
+                        <a:t>-</a:t>
+                      </a:r>
+                    </a:p>
+                  </a:txBody>
+                  <a:tcPr/>
+                </a:tc>
+                <a:tc>
+                  <a:txBody>
+                    <a:bodyPr/>
+                    <a:lstStyle/>
+                    <a:p>
+                      <a:r>
+                        <a:rPr lang="en-US" dirty="0" err="1"/>
+                        <a:t>Cuti</a:t>
+                      </a:r>
+                      <a:r>
+                        <a:rPr lang="en-US" dirty="0"/>
+                        <a:t> </a:t>
+                      </a:r>
+                      <a:r>
+                        <a:rPr lang="en-US" dirty="0" err="1"/>
+                        <a:t>Sunat</a:t>
+                      </a:r>
+                      <a:r>
+                        <a:rPr lang="en-US" dirty="0"/>
+                        <a:t> &amp; </a:t>
+                      </a:r>
+                      <a:r>
+                        <a:rPr lang="en-US" dirty="0" err="1"/>
+                        <a:t>Cuti</a:t>
+                      </a:r>
+                      <a:r>
+                        <a:rPr lang="en-US" dirty="0"/>
+                        <a:t> </a:t>
+                      </a:r>
+                      <a:r>
+                        <a:rPr lang="en-US" dirty="0" err="1"/>
+                        <a:t>Melahirkan</a:t>
+                      </a:r>
+                      <a:endParaRPr lang="en-US" dirty="0"/>
+                    </a:p>
+                  </a:txBody>
+                  <a:tcPr/>
+                </a:tc>
+                <a:extLst>
+                  <a:ext uri="{0D108BD9-81ED-4DB2-BD59-A6C34878D82A}">
+                    <a16:rowId xmlns:a16="http://schemas.microsoft.com/office/drawing/2014/main" val="1521744179"/>
+                  </a:ext>
+                </a:extLst>
+              </a:tr>
+              <a:tr h="370840">
+                <a:tc>
+                  <a:txBody>
+                    <a:bodyPr/>
+                    <a:lstStyle/>
+                    <a:p>
+                      <a:r>
+                        <a:rPr lang="en-US" dirty="0"/>
+                        <a:t>F</a:t>
+                      </a:r>
+                    </a:p>
+                  </a:txBody>
+                  <a:tcPr/>
+                </a:tc>
+                <a:tc>
+                  <a:txBody>
+                    <a:bodyPr/>
+                    <a:lstStyle/>
+                    <a:p>
+                      <a:r>
+                        <a:rPr lang="en-US"/>
+                        <a:t>N</a:t>
+                      </a:r>
+                      <a:endParaRPr lang="en-US" dirty="0"/>
+                    </a:p>
+                  </a:txBody>
+                  <a:tcPr/>
+                </a:tc>
+                <a:tc>
+                  <a:txBody>
+                    <a:bodyPr/>
+                    <a:lstStyle/>
+                    <a:p>
+                      <a:r>
+                        <a:rPr lang="en-US" dirty="0"/>
+                        <a:t>Non-Muslim</a:t>
+                      </a:r>
+                    </a:p>
+                  </a:txBody>
+                  <a:tcPr/>
+                </a:tc>
+                <a:tc>
+                  <a:txBody>
+                    <a:bodyPr/>
+                    <a:lstStyle/>
+                    <a:p>
+                      <a:r>
+                        <a:rPr lang="en-US" dirty="0"/>
+                        <a:t>-</a:t>
+                      </a:r>
+                    </a:p>
+                  </a:txBody>
+                  <a:tcPr/>
+                </a:tc>
+                <a:tc>
+                  <a:txBody>
+                    <a:bodyPr/>
+                    <a:lstStyle/>
+                    <a:p>
+                      <a:pPr marL="0" marR="0" lvl="0" indent="0" algn="l" defTabSz="457200" rtl="0" eaLnBrk="1" fontAlgn="auto" latinLnBrk="0" hangingPunct="1">
+                        <a:lnSpc>
+                          <a:spcPct val="100000"/>
+                        </a:lnSpc>
+                        <a:spcBef>
+                          <a:spcPts val="0"/>
+                        </a:spcBef>
+                        <a:spcAft>
+                          <a:spcPts val="0"/>
+                        </a:spcAft>
+                        <a:buClrTx/>
+                        <a:buSzTx/>
+                        <a:buFontTx/>
+                        <a:buNone/>
+                        <a:tabLst/>
+                        <a:defRPr/>
+                      </a:pPr>
+                      <a:r>
+                        <a:rPr lang="en-US" dirty="0" err="1"/>
+                        <a:t>Cuti</a:t>
+                      </a:r>
+                      <a:r>
+                        <a:rPr lang="en-US" dirty="0"/>
+                        <a:t> </a:t>
+                      </a:r>
+                      <a:r>
+                        <a:rPr lang="en-US" dirty="0" err="1"/>
+                        <a:t>Sunat</a:t>
+                      </a:r>
+                      <a:r>
+                        <a:rPr lang="en-US" dirty="0"/>
+                        <a:t>, </a:t>
+                      </a:r>
+                      <a:r>
+                        <a:rPr lang="en-US" dirty="0" err="1"/>
+                        <a:t>Cuti</a:t>
+                      </a:r>
+                      <a:r>
+                        <a:rPr lang="en-US" dirty="0"/>
+                        <a:t> </a:t>
+                      </a:r>
+                      <a:r>
+                        <a:rPr lang="en-US" dirty="0" err="1"/>
+                        <a:t>Melahirkan</a:t>
+                      </a:r>
+                      <a:r>
+                        <a:rPr lang="en-US" dirty="0"/>
+                        <a:t>, </a:t>
+                      </a:r>
+                      <a:r>
+                        <a:rPr lang="en-US" dirty="0" err="1"/>
+                        <a:t>Cuti</a:t>
+                      </a:r>
+                      <a:r>
+                        <a:rPr lang="en-US" dirty="0"/>
+                        <a:t> </a:t>
+                      </a:r>
+                      <a:r>
+                        <a:rPr lang="en-US" dirty="0" err="1"/>
+                        <a:t>Umroh</a:t>
+                      </a:r>
+                      <a:r>
+                        <a:rPr lang="en-US" dirty="0"/>
+                        <a:t> &amp; </a:t>
+                      </a:r>
+                      <a:r>
+                        <a:rPr lang="en-US" dirty="0" err="1"/>
+                        <a:t>Cuti</a:t>
+                      </a:r>
+                      <a:r>
+                        <a:rPr lang="en-US" dirty="0"/>
+                        <a:t> Haji</a:t>
+                      </a:r>
+                    </a:p>
+                  </a:txBody>
+                  <a:tcPr/>
+                </a:tc>
+                <a:extLst>
+                  <a:ext uri="{0D108BD9-81ED-4DB2-BD59-A6C34878D82A}">
+                    <a16:rowId xmlns:a16="http://schemas.microsoft.com/office/drawing/2014/main" val="607317499"/>
+                  </a:ext>
+                </a:extLst>
+              </a:tr>
+              <a:tr h="370840">
+                <a:tc>
+                  <a:txBody>
+                    <a:bodyPr/>
+                    <a:lstStyle/>
+                    <a:p>
+                      <a:r>
+                        <a:rPr lang="en-US" dirty="0"/>
+                        <a:t>M</a:t>
+                      </a:r>
+                    </a:p>
+                  </a:txBody>
+                  <a:tcPr/>
+                </a:tc>
+                <a:tc>
+                  <a:txBody>
+                    <a:bodyPr/>
+                    <a:lstStyle/>
+                    <a:p>
+                      <a:r>
+                        <a:rPr lang="en-US" dirty="0"/>
+                        <a:t>Y</a:t>
+                      </a:r>
+                    </a:p>
+                  </a:txBody>
+                  <a:tcPr/>
+                </a:tc>
+                <a:tc>
+                  <a:txBody>
+                    <a:bodyPr/>
+                    <a:lstStyle/>
+                    <a:p>
+                      <a:r>
+                        <a:rPr lang="en-US" dirty="0"/>
+                        <a:t>Islam</a:t>
+                      </a:r>
+                    </a:p>
+                  </a:txBody>
+                  <a:tcPr/>
+                </a:tc>
+                <a:tc>
+                  <a:txBody>
+                    <a:bodyPr/>
+                    <a:lstStyle/>
+                    <a:p>
+                      <a:r>
+                        <a:rPr lang="en-US" dirty="0"/>
+                        <a:t>&gt;0</a:t>
+                      </a:r>
+                    </a:p>
+                  </a:txBody>
+                  <a:tcPr/>
+                </a:tc>
+                <a:tc>
+                  <a:txBody>
+                    <a:bodyPr/>
+                    <a:lstStyle/>
+                    <a:p>
+                      <a:r>
+                        <a:rPr lang="en-US" dirty="0" err="1"/>
+                        <a:t>Cuti</a:t>
+                      </a:r>
+                      <a:r>
+                        <a:rPr lang="en-US" dirty="0"/>
+                        <a:t> </a:t>
+                      </a:r>
+                      <a:r>
+                        <a:rPr lang="en-US" dirty="0" err="1"/>
+                        <a:t>Melahirkan</a:t>
+                      </a:r>
+                      <a:r>
+                        <a:rPr lang="en-US" dirty="0"/>
+                        <a:t> &amp; </a:t>
+                      </a:r>
+                      <a:r>
+                        <a:rPr lang="en-US" dirty="0" err="1"/>
+                        <a:t>Cuti</a:t>
+                      </a:r>
+                      <a:r>
+                        <a:rPr lang="en-US" dirty="0"/>
+                        <a:t> </a:t>
+                      </a:r>
+                      <a:r>
+                        <a:rPr lang="en-US" dirty="0" err="1"/>
+                        <a:t>Menikah</a:t>
+                      </a:r>
+                      <a:endParaRPr lang="en-US" dirty="0"/>
+                    </a:p>
+                  </a:txBody>
+                  <a:tcPr/>
+                </a:tc>
+                <a:extLst>
+                  <a:ext uri="{0D108BD9-81ED-4DB2-BD59-A6C34878D82A}">
+                    <a16:rowId xmlns:a16="http://schemas.microsoft.com/office/drawing/2014/main" val="206706881"/>
+                  </a:ext>
+                </a:extLst>
+              </a:tr>
+              <a:tr h="370840">
+                <a:tc>
+                  <a:txBody>
+                    <a:bodyPr/>
+                    <a:lstStyle/>
+                    <a:p>
+                      <a:r>
+                        <a:rPr lang="en-US" dirty="0"/>
+                        <a:t>M</a:t>
+                      </a:r>
+                    </a:p>
+                  </a:txBody>
+                  <a:tcPr/>
+                </a:tc>
+                <a:tc>
+                  <a:txBody>
+                    <a:bodyPr/>
+                    <a:lstStyle/>
+                    <a:p>
+                      <a:r>
+                        <a:rPr lang="en-US" dirty="0"/>
+                        <a:t>Y</a:t>
+                      </a:r>
+                    </a:p>
+                  </a:txBody>
+                  <a:tcPr/>
+                </a:tc>
+                <a:tc>
+                  <a:txBody>
+                    <a:bodyPr/>
+                    <a:lstStyle/>
+                    <a:p>
+                      <a:r>
+                        <a:rPr lang="en-US" dirty="0"/>
+                        <a:t>Non-Muslim</a:t>
+                      </a:r>
+                    </a:p>
+                  </a:txBody>
+                  <a:tcPr/>
+                </a:tc>
+                <a:tc>
+                  <a:txBody>
+                    <a:bodyPr/>
+                    <a:lstStyle/>
+                    <a:p>
+                      <a:r>
+                        <a:rPr lang="en-US" dirty="0"/>
+                        <a:t>&gt;0</a:t>
+                      </a:r>
+                    </a:p>
+                  </a:txBody>
+                  <a:tcPr/>
+                </a:tc>
+                <a:tc>
+                  <a:txBody>
+                    <a:bodyPr/>
+                    <a:lstStyle/>
+                    <a:p>
+                      <a:pPr marL="0" marR="0" lvl="0" indent="0" algn="l" defTabSz="457200" rtl="0" eaLnBrk="1" fontAlgn="auto" latinLnBrk="0" hangingPunct="1">
+                        <a:lnSpc>
+                          <a:spcPct val="100000"/>
+                        </a:lnSpc>
+                        <a:spcBef>
+                          <a:spcPts val="0"/>
+                        </a:spcBef>
+                        <a:spcAft>
+                          <a:spcPts val="0"/>
+                        </a:spcAft>
+                        <a:buClrTx/>
+                        <a:buSzTx/>
+                        <a:buFontTx/>
+                        <a:buNone/>
+                        <a:tabLst/>
+                        <a:defRPr/>
+                      </a:pPr>
+                      <a:r>
+                        <a:rPr lang="en-US" dirty="0" err="1"/>
+                        <a:t>Cuti</a:t>
+                      </a:r>
+                      <a:r>
+                        <a:rPr lang="en-US" dirty="0"/>
+                        <a:t> </a:t>
+                      </a:r>
+                      <a:r>
+                        <a:rPr lang="en-US" dirty="0" err="1"/>
+                        <a:t>Melahirkan</a:t>
+                      </a:r>
+                      <a:r>
+                        <a:rPr lang="en-US" dirty="0"/>
+                        <a:t>, </a:t>
+                      </a:r>
+                      <a:r>
+                        <a:rPr lang="en-US" dirty="0" err="1"/>
+                        <a:t>Cuti</a:t>
+                      </a:r>
+                      <a:r>
+                        <a:rPr lang="en-US" dirty="0"/>
+                        <a:t> </a:t>
+                      </a:r>
+                      <a:r>
+                        <a:rPr lang="en-US" dirty="0" err="1"/>
+                        <a:t>Menikah</a:t>
+                      </a:r>
+                      <a:r>
+                        <a:rPr lang="en-US" dirty="0"/>
+                        <a:t>, </a:t>
+                      </a:r>
+                      <a:r>
+                        <a:rPr lang="en-US" dirty="0" err="1"/>
+                        <a:t>Cuti</a:t>
+                      </a:r>
+                      <a:r>
+                        <a:rPr lang="en-US" dirty="0"/>
+                        <a:t> </a:t>
+                      </a:r>
+                      <a:r>
+                        <a:rPr lang="en-US" dirty="0" err="1"/>
+                        <a:t>Umroh</a:t>
+                      </a:r>
+                      <a:r>
+                        <a:rPr lang="en-US" dirty="0"/>
+                        <a:t> &amp; </a:t>
+                      </a:r>
+                      <a:r>
+                        <a:rPr lang="en-US" dirty="0" err="1"/>
+                        <a:t>Cuti</a:t>
+                      </a:r>
+                      <a:r>
+                        <a:rPr lang="en-US" dirty="0"/>
+                        <a:t> Haji</a:t>
+                      </a:r>
+                    </a:p>
+                  </a:txBody>
+                  <a:tcPr/>
+                </a:tc>
+                <a:extLst>
+                  <a:ext uri="{0D108BD9-81ED-4DB2-BD59-A6C34878D82A}">
+                    <a16:rowId xmlns:a16="http://schemas.microsoft.com/office/drawing/2014/main" val="2837379263"/>
+                  </a:ext>
+                </a:extLst>
+              </a:tr>
+              <a:tr h="370840">
+                <a:tc>
+                  <a:txBody>
+                    <a:bodyPr/>
+                    <a:lstStyle/>
+                    <a:p>
+                      <a:r>
+                        <a:rPr lang="en-US" dirty="0"/>
+                        <a:t>M</a:t>
+                      </a:r>
+                    </a:p>
+                  </a:txBody>
+                  <a:tcPr/>
+                </a:tc>
+                <a:tc>
+                  <a:txBody>
+                    <a:bodyPr/>
+                    <a:lstStyle/>
+                    <a:p>
+                      <a:r>
+                        <a:rPr lang="en-US" dirty="0"/>
+                        <a:t>N</a:t>
+                      </a:r>
+                    </a:p>
+                  </a:txBody>
+                  <a:tcPr/>
+                </a:tc>
+                <a:tc>
+                  <a:txBody>
+                    <a:bodyPr/>
+                    <a:lstStyle/>
+                    <a:p>
+                      <a:r>
+                        <a:rPr lang="en-US" dirty="0"/>
+                        <a:t>Islam</a:t>
+                      </a:r>
+                    </a:p>
+                  </a:txBody>
+                  <a:tcPr/>
+                </a:tc>
+                <a:tc>
+                  <a:txBody>
+                    <a:bodyPr/>
+                    <a:lstStyle/>
+                    <a:p>
+                      <a:r>
+                        <a:rPr lang="en-US" dirty="0"/>
+                        <a:t>-</a:t>
+                      </a:r>
+                    </a:p>
+                  </a:txBody>
+                  <a:tcPr/>
+                </a:tc>
+                <a:tc>
+                  <a:txBody>
+                    <a:bodyPr/>
+                    <a:lstStyle/>
+                    <a:p>
+                      <a:r>
+                        <a:rPr lang="en-US" dirty="0" err="1"/>
+                        <a:t>Cuti</a:t>
+                      </a:r>
+                      <a:r>
+                        <a:rPr lang="en-US" dirty="0"/>
+                        <a:t> </a:t>
+                      </a:r>
+                      <a:r>
+                        <a:rPr lang="en-US" dirty="0" err="1"/>
+                        <a:t>Melahirkan</a:t>
+                      </a:r>
+                      <a:r>
+                        <a:rPr lang="en-US" dirty="0"/>
+                        <a:t> &amp; </a:t>
+                      </a:r>
+                      <a:r>
+                        <a:rPr lang="en-US" dirty="0" err="1"/>
+                        <a:t>Cuti</a:t>
+                      </a:r>
+                      <a:r>
+                        <a:rPr lang="en-US" dirty="0"/>
+                        <a:t> </a:t>
+                      </a:r>
+                      <a:r>
+                        <a:rPr lang="en-US" dirty="0" err="1"/>
+                        <a:t>Sunat</a:t>
+                      </a:r>
+                      <a:endParaRPr lang="en-US" dirty="0"/>
+                    </a:p>
+                  </a:txBody>
+                  <a:tcPr/>
+                </a:tc>
+                <a:extLst>
+                  <a:ext uri="{0D108BD9-81ED-4DB2-BD59-A6C34878D82A}">
+                    <a16:rowId xmlns:a16="http://schemas.microsoft.com/office/drawing/2014/main" val="134270848"/>
+                  </a:ext>
+                </a:extLst>
+              </a:tr>
+              <a:tr h="370840">
+                <a:tc>
+                  <a:txBody>
+                    <a:bodyPr/>
+                    <a:lstStyle/>
+                    <a:p>
+                      <a:r>
+                        <a:rPr lang="en-US" dirty="0"/>
+                        <a:t>M</a:t>
+                      </a:r>
+                    </a:p>
+                  </a:txBody>
+                  <a:tcPr/>
+                </a:tc>
+                <a:tc>
+                  <a:txBody>
+                    <a:bodyPr/>
+                    <a:lstStyle/>
+                    <a:p>
+                      <a:r>
+                        <a:rPr lang="en-US" dirty="0"/>
+                        <a:t>N</a:t>
+                      </a:r>
+                    </a:p>
+                  </a:txBody>
+                  <a:tcPr/>
+                </a:tc>
+                <a:tc>
+                  <a:txBody>
+                    <a:bodyPr/>
+                    <a:lstStyle/>
+                    <a:p>
+                      <a:r>
+                        <a:rPr lang="en-US" dirty="0"/>
+                        <a:t>Non-Muslim</a:t>
+                      </a:r>
+                    </a:p>
+                  </a:txBody>
+                  <a:tcPr/>
+                </a:tc>
+                <a:tc>
+                  <a:txBody>
+                    <a:bodyPr/>
+                    <a:lstStyle/>
+                    <a:p>
+                      <a:r>
+                        <a:rPr lang="en-US" dirty="0"/>
+                        <a:t>-</a:t>
+                      </a:r>
+                    </a:p>
+                  </a:txBody>
+                  <a:tcPr/>
+                </a:tc>
+                <a:tc>
+                  <a:txBody>
+                    <a:bodyPr/>
+                    <a:lstStyle/>
+                    <a:p>
+                      <a:pPr marL="0" marR="0" lvl="0" indent="0" algn="l" defTabSz="457200" rtl="0" eaLnBrk="1" fontAlgn="auto" latinLnBrk="0" hangingPunct="1">
+                        <a:lnSpc>
+                          <a:spcPct val="100000"/>
+                        </a:lnSpc>
+                        <a:spcBef>
+                          <a:spcPts val="0"/>
+                        </a:spcBef>
+                        <a:spcAft>
+                          <a:spcPts val="0"/>
+                        </a:spcAft>
+                        <a:buClrTx/>
+                        <a:buSzTx/>
+                        <a:buFontTx/>
+                        <a:buNone/>
+                        <a:tabLst/>
+                        <a:defRPr/>
+                      </a:pPr>
+                      <a:r>
+                        <a:rPr lang="en-US" dirty="0" err="1"/>
+                        <a:t>Cuti</a:t>
+                      </a:r>
+                      <a:r>
+                        <a:rPr lang="en-US" dirty="0"/>
+                        <a:t> </a:t>
+                      </a:r>
+                      <a:r>
+                        <a:rPr lang="en-US" dirty="0" err="1"/>
+                        <a:t>Melahirkan</a:t>
+                      </a:r>
+                      <a:r>
+                        <a:rPr lang="en-US" dirty="0"/>
+                        <a:t>, </a:t>
+                      </a:r>
+                      <a:r>
+                        <a:rPr lang="en-US" dirty="0" err="1"/>
+                        <a:t>Cuti</a:t>
+                      </a:r>
+                      <a:r>
+                        <a:rPr lang="en-US" dirty="0"/>
+                        <a:t> </a:t>
+                      </a:r>
+                      <a:r>
+                        <a:rPr lang="en-US" dirty="0" err="1"/>
+                        <a:t>Sunat</a:t>
+                      </a:r>
+                      <a:r>
+                        <a:rPr lang="en-US" dirty="0"/>
+                        <a:t>, </a:t>
+                      </a:r>
+                      <a:r>
+                        <a:rPr lang="en-US" dirty="0" err="1"/>
+                        <a:t>Cuti</a:t>
+                      </a:r>
+                      <a:r>
+                        <a:rPr lang="en-US" dirty="0"/>
+                        <a:t> </a:t>
+                      </a:r>
+                      <a:r>
+                        <a:rPr lang="en-US" dirty="0" err="1"/>
+                        <a:t>Umroh</a:t>
+                      </a:r>
+                      <a:r>
+                        <a:rPr lang="en-US" dirty="0"/>
+                        <a:t> &amp; </a:t>
+                      </a:r>
+                      <a:r>
+                        <a:rPr lang="en-US" dirty="0" err="1"/>
+                        <a:t>Cuti</a:t>
+                      </a:r>
+                      <a:r>
+                        <a:rPr lang="en-US" dirty="0"/>
+                        <a:t> Haji</a:t>
+                      </a:r>
+                    </a:p>
+                  </a:txBody>
+                  <a:tcPr/>
+                </a:tc>
+                <a:extLst>
+                  <a:ext uri="{0D108BD9-81ED-4DB2-BD59-A6C34878D82A}">
+                    <a16:rowId xmlns:a16="http://schemas.microsoft.com/office/drawing/2014/main" val="4065313603"/>
+                  </a:ext>
+                </a:extLst>
+              </a:tr>
+            </a:tbl>
+          </a:graphicData>
+        </a:graphic>
+      </p:graphicFrame>
+    </p:spTree>
+    <p:extLst>
+      <p:ext uri="{BB962C8B-B14F-4D97-AF65-F5344CB8AC3E}">
+        <p14:creationId xmlns:p14="http://schemas.microsoft.com/office/powerpoint/2010/main" val="1592422235"/>
+      </p:ext>
+    </p:extLst>
+  </p:cSld>
+  <p:clrMapOvr>
+    <a:masterClrMapping/>
+  </p:clrMapOvr>
+</p:sld>
+</file>
+
 <file path=ppt/slides/slide4.xml><?xml version="1.0" encoding="utf-8"?>
 <p:sld xmlns:a="http://schemas.openxmlformats.org/drawingml/2006/main" xmlns:r="http://schemas.openxmlformats.org/officeDocument/2006/relationships" xmlns:p="http://schemas.openxmlformats.org/presentationml/2006/main">
   <p:cSld>

</xml_diff>

<commit_message>
update ppt update deskripsi & gambar activity employee di laporan update gambar activity manage employee
</commit_message>
<xml_diff>
--- a/Aplikasi Pengajuan Cuti.pptx
+++ b/Aplikasi Pengajuan Cuti.pptx
@@ -13,31 +13,30 @@
     <p:sldId id="285" r:id="rId7"/>
     <p:sldId id="286" r:id="rId8"/>
     <p:sldId id="287" r:id="rId9"/>
-    <p:sldId id="259" r:id="rId10"/>
-    <p:sldId id="260" r:id="rId11"/>
-    <p:sldId id="261" r:id="rId12"/>
-    <p:sldId id="262" r:id="rId13"/>
-    <p:sldId id="263" r:id="rId14"/>
-    <p:sldId id="264" r:id="rId15"/>
-    <p:sldId id="265" r:id="rId16"/>
-    <p:sldId id="266" r:id="rId17"/>
-    <p:sldId id="267" r:id="rId18"/>
-    <p:sldId id="268" r:id="rId19"/>
-    <p:sldId id="270" r:id="rId20"/>
-    <p:sldId id="271" r:id="rId21"/>
-    <p:sldId id="272" r:id="rId22"/>
-    <p:sldId id="273" r:id="rId23"/>
-    <p:sldId id="274" r:id="rId24"/>
-    <p:sldId id="275" r:id="rId25"/>
-    <p:sldId id="276" r:id="rId26"/>
-    <p:sldId id="277" r:id="rId27"/>
-    <p:sldId id="278" r:id="rId28"/>
-    <p:sldId id="279" r:id="rId29"/>
-    <p:sldId id="280" r:id="rId30"/>
-    <p:sldId id="281" r:id="rId31"/>
-    <p:sldId id="282" r:id="rId32"/>
-    <p:sldId id="269" r:id="rId33"/>
-    <p:sldId id="288" r:id="rId34"/>
+    <p:sldId id="260" r:id="rId10"/>
+    <p:sldId id="261" r:id="rId11"/>
+    <p:sldId id="262" r:id="rId12"/>
+    <p:sldId id="263" r:id="rId13"/>
+    <p:sldId id="264" r:id="rId14"/>
+    <p:sldId id="265" r:id="rId15"/>
+    <p:sldId id="266" r:id="rId16"/>
+    <p:sldId id="267" r:id="rId17"/>
+    <p:sldId id="268" r:id="rId18"/>
+    <p:sldId id="270" r:id="rId19"/>
+    <p:sldId id="271" r:id="rId20"/>
+    <p:sldId id="272" r:id="rId21"/>
+    <p:sldId id="273" r:id="rId22"/>
+    <p:sldId id="274" r:id="rId23"/>
+    <p:sldId id="275" r:id="rId24"/>
+    <p:sldId id="276" r:id="rId25"/>
+    <p:sldId id="277" r:id="rId26"/>
+    <p:sldId id="278" r:id="rId27"/>
+    <p:sldId id="279" r:id="rId28"/>
+    <p:sldId id="280" r:id="rId29"/>
+    <p:sldId id="281" r:id="rId30"/>
+    <p:sldId id="282" r:id="rId31"/>
+    <p:sldId id="269" r:id="rId32"/>
+    <p:sldId id="288" r:id="rId33"/>
   </p:sldIdLst>
   <p:sldSz cx="12192000" cy="6858000"/>
   <p:notesSz cx="6858000" cy="9144000"/>
@@ -5472,53 +5471,12 @@
           <a:chExt cx="0" cy="0"/>
         </a:xfrm>
       </p:grpSpPr>
-      <p:sp>
-        <p:nvSpPr>
-          <p:cNvPr id="2" name="Judul 1">
+      <p:pic>
+        <p:nvPicPr>
+          <p:cNvPr id="9" name="Tampungan Konten 8">
             <a:extLst>
               <a:ext uri="{FF2B5EF4-FFF2-40B4-BE49-F238E27FC236}">
-                <a16:creationId xmlns:a16="http://schemas.microsoft.com/office/drawing/2014/main" id="{3EA23E20-EAA6-4876-8DA1-DFA3583EC802}"/>
-              </a:ext>
-            </a:extLst>
-          </p:cNvPr>
-          <p:cNvSpPr>
-            <a:spLocks noGrp="1"/>
-          </p:cNvSpPr>
-          <p:nvPr>
-            <p:ph type="title"/>
-          </p:nvPr>
-        </p:nvSpPr>
-        <p:spPr>
-          <a:xfrm>
-            <a:off x="658454" y="453981"/>
-            <a:ext cx="8534400" cy="1507067"/>
-          </a:xfrm>
-        </p:spPr>
-        <p:txBody>
-          <a:bodyPr/>
-          <a:lstStyle/>
-          <a:p>
-            <a:r>
-              <a:rPr lang="en-US" dirty="0"/>
-              <a:t>Activity </a:t>
-            </a:r>
-            <a:r>
-              <a:rPr lang="en-US" dirty="0" err="1"/>
-              <a:t>Tambah</a:t>
-            </a:r>
-            <a:r>
-              <a:rPr lang="en-US" dirty="0"/>
-              <a:t> employee</a:t>
-            </a:r>
-          </a:p>
-        </p:txBody>
-      </p:sp>
-      <p:pic>
-        <p:nvPicPr>
-          <p:cNvPr id="7" name="Tampungan Konten 6">
-            <a:extLst>
-              <a:ext uri="{FF2B5EF4-FFF2-40B4-BE49-F238E27FC236}">
-                <a16:creationId xmlns:a16="http://schemas.microsoft.com/office/drawing/2014/main" id="{C83EDD9F-FF3D-46CC-9411-DB6459059478}"/>
+                <a16:creationId xmlns:a16="http://schemas.microsoft.com/office/drawing/2014/main" id="{A8E0D64D-0653-427E-B91E-CD54D19A325C}"/>
               </a:ext>
             </a:extLst>
           </p:cNvPr>
@@ -5537,15 +5495,15 @@
         </p:blipFill>
         <p:spPr>
           <a:xfrm>
-            <a:off x="3308178" y="1484290"/>
-            <a:ext cx="5101726" cy="5280240"/>
+            <a:off x="2636853" y="134949"/>
+            <a:ext cx="5901840" cy="6588102"/>
           </a:xfrm>
         </p:spPr>
       </p:pic>
     </p:spTree>
     <p:extLst>
       <p:ext uri="{BB962C8B-B14F-4D97-AF65-F5344CB8AC3E}">
-        <p14:creationId xmlns:p14="http://schemas.microsoft.com/office/powerpoint/2010/main" val="4078357735"/>
+        <p14:creationId xmlns:p14="http://schemas.microsoft.com/office/powerpoint/2010/main" val="1777285952"/>
       </p:ext>
     </p:extLst>
   </p:cSld>
@@ -5572,45 +5530,12 @@
           <a:chExt cx="0" cy="0"/>
         </a:xfrm>
       </p:grpSpPr>
-      <p:sp>
-        <p:nvSpPr>
-          <p:cNvPr id="2" name="Judul 1">
+      <p:pic>
+        <p:nvPicPr>
+          <p:cNvPr id="9" name="Tampungan Konten 8">
             <a:extLst>
               <a:ext uri="{FF2B5EF4-FFF2-40B4-BE49-F238E27FC236}">
-                <a16:creationId xmlns:a16="http://schemas.microsoft.com/office/drawing/2014/main" id="{3EA23E20-EAA6-4876-8DA1-DFA3583EC802}"/>
-              </a:ext>
-            </a:extLst>
-          </p:cNvPr>
-          <p:cNvSpPr>
-            <a:spLocks noGrp="1"/>
-          </p:cNvSpPr>
-          <p:nvPr>
-            <p:ph type="title"/>
-          </p:nvPr>
-        </p:nvSpPr>
-        <p:spPr>
-          <a:xfrm>
-            <a:off x="658454" y="453981"/>
-            <a:ext cx="8534400" cy="1507067"/>
-          </a:xfrm>
-        </p:spPr>
-        <p:txBody>
-          <a:bodyPr/>
-          <a:lstStyle/>
-          <a:p>
-            <a:r>
-              <a:rPr lang="en-US" dirty="0"/>
-              <a:t>Activity Edit employee</a:t>
-            </a:r>
-          </a:p>
-        </p:txBody>
-      </p:sp>
-      <p:pic>
-        <p:nvPicPr>
-          <p:cNvPr id="6" name="Tampungan Konten 5">
-            <a:extLst>
-              <a:ext uri="{FF2B5EF4-FFF2-40B4-BE49-F238E27FC236}">
-                <a16:creationId xmlns:a16="http://schemas.microsoft.com/office/drawing/2014/main" id="{0237FFFF-F88E-4FC5-9046-8B4F87F76612}"/>
+                <a16:creationId xmlns:a16="http://schemas.microsoft.com/office/drawing/2014/main" id="{E4E201E4-E8F1-40AA-B5C9-7123A0AD4216}"/>
               </a:ext>
             </a:extLst>
           </p:cNvPr>
@@ -5629,15 +5554,15 @@
         </p:blipFill>
         <p:spPr>
           <a:xfrm>
-            <a:off x="3425654" y="1497169"/>
-            <a:ext cx="4919856" cy="5251640"/>
+            <a:off x="2573757" y="68873"/>
+            <a:ext cx="6428575" cy="6720253"/>
           </a:xfrm>
         </p:spPr>
       </p:pic>
     </p:spTree>
     <p:extLst>
       <p:ext uri="{BB962C8B-B14F-4D97-AF65-F5344CB8AC3E}">
-        <p14:creationId xmlns:p14="http://schemas.microsoft.com/office/powerpoint/2010/main" val="1777285952"/>
+        <p14:creationId xmlns:p14="http://schemas.microsoft.com/office/powerpoint/2010/main" val="3536389999"/>
       </p:ext>
     </p:extLst>
   </p:cSld>
@@ -5664,53 +5589,12 @@
           <a:chExt cx="0" cy="0"/>
         </a:xfrm>
       </p:grpSpPr>
-      <p:sp>
-        <p:nvSpPr>
-          <p:cNvPr id="2" name="Judul 1">
+      <p:pic>
+        <p:nvPicPr>
+          <p:cNvPr id="9" name="Tampungan Konten 8">
             <a:extLst>
               <a:ext uri="{FF2B5EF4-FFF2-40B4-BE49-F238E27FC236}">
-                <a16:creationId xmlns:a16="http://schemas.microsoft.com/office/drawing/2014/main" id="{3EA23E20-EAA6-4876-8DA1-DFA3583EC802}"/>
-              </a:ext>
-            </a:extLst>
-          </p:cNvPr>
-          <p:cNvSpPr>
-            <a:spLocks noGrp="1"/>
-          </p:cNvSpPr>
-          <p:nvPr>
-            <p:ph type="title"/>
-          </p:nvPr>
-        </p:nvSpPr>
-        <p:spPr>
-          <a:xfrm>
-            <a:off x="658454" y="453981"/>
-            <a:ext cx="8534400" cy="1507067"/>
-          </a:xfrm>
-        </p:spPr>
-        <p:txBody>
-          <a:bodyPr/>
-          <a:lstStyle/>
-          <a:p>
-            <a:r>
-              <a:rPr lang="en-US" dirty="0"/>
-              <a:t>Activity </a:t>
-            </a:r>
-            <a:r>
-              <a:rPr lang="en-US" dirty="0" err="1"/>
-              <a:t>hapus</a:t>
-            </a:r>
-            <a:r>
-              <a:rPr lang="en-US" dirty="0"/>
-              <a:t> employee</a:t>
-            </a:r>
-          </a:p>
-        </p:txBody>
-      </p:sp>
-      <p:pic>
-        <p:nvPicPr>
-          <p:cNvPr id="7" name="Tampungan Konten 6">
-            <a:extLst>
-              <a:ext uri="{FF2B5EF4-FFF2-40B4-BE49-F238E27FC236}">
-                <a16:creationId xmlns:a16="http://schemas.microsoft.com/office/drawing/2014/main" id="{9FDFBC10-4127-47DE-890D-13608D65BD39}"/>
+                <a16:creationId xmlns:a16="http://schemas.microsoft.com/office/drawing/2014/main" id="{2E463981-9A8B-4BB9-9340-00D38D7C9DE1}"/>
               </a:ext>
             </a:extLst>
           </p:cNvPr>
@@ -5729,15 +5613,15 @@
         </p:blipFill>
         <p:spPr>
           <a:xfrm>
-            <a:off x="3347921" y="1471411"/>
-            <a:ext cx="5177893" cy="5208713"/>
+            <a:off x="2171704" y="101421"/>
+            <a:ext cx="7848591" cy="6655157"/>
           </a:xfrm>
         </p:spPr>
       </p:pic>
     </p:spTree>
     <p:extLst>
       <p:ext uri="{BB962C8B-B14F-4D97-AF65-F5344CB8AC3E}">
-        <p14:creationId xmlns:p14="http://schemas.microsoft.com/office/powerpoint/2010/main" val="3536389999"/>
+        <p14:creationId xmlns:p14="http://schemas.microsoft.com/office/powerpoint/2010/main" val="2261295904"/>
       </p:ext>
     </p:extLst>
   </p:cSld>
@@ -5800,15 +5684,7 @@
             </a:r>
             <a:r>
               <a:rPr lang="en-US" dirty="0"/>
-              <a:t> </a:t>
-            </a:r>
-            <a:r>
-              <a:rPr lang="en-US" dirty="0" err="1"/>
-              <a:t>aturan</a:t>
-            </a:r>
-            <a:r>
-              <a:rPr lang="en-US" dirty="0"/>
-              <a:t> </a:t>
+              <a:t> history </a:t>
             </a:r>
             <a:r>
               <a:rPr lang="en-US" dirty="0" err="1"/>
@@ -5820,10 +5696,10 @@
       </p:sp>
       <p:pic>
         <p:nvPicPr>
-          <p:cNvPr id="6" name="Tampungan Konten 5">
+          <p:cNvPr id="7" name="Tampungan Konten 6">
             <a:extLst>
               <a:ext uri="{FF2B5EF4-FFF2-40B4-BE49-F238E27FC236}">
-                <a16:creationId xmlns:a16="http://schemas.microsoft.com/office/drawing/2014/main" id="{CF115B08-6D98-43D1-B3D4-76A1E8ED3124}"/>
+                <a16:creationId xmlns:a16="http://schemas.microsoft.com/office/drawing/2014/main" id="{EA9DD2F4-628B-4E9A-8017-1DB4EA09B053}"/>
               </a:ext>
             </a:extLst>
           </p:cNvPr>
@@ -5842,15 +5718,15 @@
         </p:blipFill>
         <p:spPr>
           <a:xfrm>
-            <a:off x="2766322" y="1621630"/>
-            <a:ext cx="6596619" cy="5067991"/>
+            <a:off x="2802410" y="1621631"/>
+            <a:ext cx="6993434" cy="5062504"/>
           </a:xfrm>
         </p:spPr>
       </p:pic>
     </p:spTree>
     <p:extLst>
       <p:ext uri="{BB962C8B-B14F-4D97-AF65-F5344CB8AC3E}">
-        <p14:creationId xmlns:p14="http://schemas.microsoft.com/office/powerpoint/2010/main" val="2261295904"/>
+        <p14:creationId xmlns:p14="http://schemas.microsoft.com/office/powerpoint/2010/main" val="446439385"/>
       </p:ext>
     </p:extLst>
   </p:cSld>
@@ -5913,7 +5789,7 @@
             </a:r>
             <a:r>
               <a:rPr lang="en-US" dirty="0"/>
-              <a:t> history </a:t>
+              <a:t> Quota </a:t>
             </a:r>
             <a:r>
               <a:rPr lang="en-US" dirty="0" err="1"/>
@@ -5928,7 +5804,7 @@
           <p:cNvPr id="7" name="Tampungan Konten 6">
             <a:extLst>
               <a:ext uri="{FF2B5EF4-FFF2-40B4-BE49-F238E27FC236}">
-                <a16:creationId xmlns:a16="http://schemas.microsoft.com/office/drawing/2014/main" id="{EA9DD2F4-628B-4E9A-8017-1DB4EA09B053}"/>
+                <a16:creationId xmlns:a16="http://schemas.microsoft.com/office/drawing/2014/main" id="{E8496C44-1B1A-4A15-961E-22CB0B326941}"/>
               </a:ext>
             </a:extLst>
           </p:cNvPr>
@@ -5947,15 +5823,15 @@
         </p:blipFill>
         <p:spPr>
           <a:xfrm>
-            <a:off x="2802410" y="1621631"/>
-            <a:ext cx="6993434" cy="5062504"/>
+            <a:off x="2654552" y="1497169"/>
+            <a:ext cx="6538302" cy="5203256"/>
           </a:xfrm>
         </p:spPr>
       </p:pic>
     </p:spTree>
     <p:extLst>
       <p:ext uri="{BB962C8B-B14F-4D97-AF65-F5344CB8AC3E}">
-        <p14:creationId xmlns:p14="http://schemas.microsoft.com/office/powerpoint/2010/main" val="446439385"/>
+        <p14:creationId xmlns:p14="http://schemas.microsoft.com/office/powerpoint/2010/main" val="223358268"/>
       </p:ext>
     </p:extLst>
   </p:cSld>
@@ -6010,21 +5886,8 @@
           <a:p>
             <a:r>
               <a:rPr lang="en-US" dirty="0"/>
-              <a:t>Activity </a:t>
-            </a:r>
-            <a:r>
-              <a:rPr lang="en-US" dirty="0" err="1"/>
-              <a:t>lihat</a:t>
-            </a:r>
-            <a:r>
-              <a:rPr lang="en-US" dirty="0"/>
-              <a:t> Quota </a:t>
-            </a:r>
-            <a:r>
-              <a:rPr lang="en-US" dirty="0" err="1"/>
-              <a:t>cuti</a:t>
-            </a:r>
-            <a:endParaRPr lang="en-US" dirty="0"/>
+              <a:t>Activity Login</a:t>
+            </a:r>
           </a:p>
         </p:txBody>
       </p:sp>
@@ -6033,7 +5896,7 @@
           <p:cNvPr id="7" name="Tampungan Konten 6">
             <a:extLst>
               <a:ext uri="{FF2B5EF4-FFF2-40B4-BE49-F238E27FC236}">
-                <a16:creationId xmlns:a16="http://schemas.microsoft.com/office/drawing/2014/main" id="{E8496C44-1B1A-4A15-961E-22CB0B326941}"/>
+                <a16:creationId xmlns:a16="http://schemas.microsoft.com/office/drawing/2014/main" id="{27228745-DDDB-4905-9280-EBD3E3AD25B8}"/>
               </a:ext>
             </a:extLst>
           </p:cNvPr>
@@ -6052,15 +5915,15 @@
         </p:blipFill>
         <p:spPr>
           <a:xfrm>
-            <a:off x="2654552" y="1497169"/>
-            <a:ext cx="6538302" cy="5203256"/>
+            <a:off x="658453" y="1621630"/>
+            <a:ext cx="11048443" cy="5094560"/>
           </a:xfrm>
         </p:spPr>
       </p:pic>
     </p:spTree>
     <p:extLst>
       <p:ext uri="{BB962C8B-B14F-4D97-AF65-F5344CB8AC3E}">
-        <p14:creationId xmlns:p14="http://schemas.microsoft.com/office/powerpoint/2010/main" val="223358268"/>
+        <p14:creationId xmlns:p14="http://schemas.microsoft.com/office/powerpoint/2010/main" val="3806373439"/>
       </p:ext>
     </p:extLst>
   </p:cSld>
@@ -6115,98 +5978,6 @@
           <a:p>
             <a:r>
               <a:rPr lang="en-US" dirty="0"/>
-              <a:t>Activity Login</a:t>
-            </a:r>
-          </a:p>
-        </p:txBody>
-      </p:sp>
-      <p:pic>
-        <p:nvPicPr>
-          <p:cNvPr id="7" name="Tampungan Konten 6">
-            <a:extLst>
-              <a:ext uri="{FF2B5EF4-FFF2-40B4-BE49-F238E27FC236}">
-                <a16:creationId xmlns:a16="http://schemas.microsoft.com/office/drawing/2014/main" id="{27228745-DDDB-4905-9280-EBD3E3AD25B8}"/>
-              </a:ext>
-            </a:extLst>
-          </p:cNvPr>
-          <p:cNvPicPr>
-            <a:picLocks noGrp="1" noChangeAspect="1"/>
-          </p:cNvPicPr>
-          <p:nvPr>
-            <p:ph idx="1"/>
-          </p:nvPr>
-        </p:nvPicPr>
-        <p:blipFill>
-          <a:blip r:embed="rId2"/>
-          <a:stretch>
-            <a:fillRect/>
-          </a:stretch>
-        </p:blipFill>
-        <p:spPr>
-          <a:xfrm>
-            <a:off x="658453" y="1621630"/>
-            <a:ext cx="11048443" cy="5094560"/>
-          </a:xfrm>
-        </p:spPr>
-      </p:pic>
-    </p:spTree>
-    <p:extLst>
-      <p:ext uri="{BB962C8B-B14F-4D97-AF65-F5344CB8AC3E}">
-        <p14:creationId xmlns:p14="http://schemas.microsoft.com/office/powerpoint/2010/main" val="3806373439"/>
-      </p:ext>
-    </p:extLst>
-  </p:cSld>
-  <p:clrMapOvr>
-    <a:masterClrMapping/>
-  </p:clrMapOvr>
-</p:sld>
-</file>
-
-<file path=ppt/slides/slide17.xml><?xml version="1.0" encoding="utf-8"?>
-<p:sld xmlns:a="http://schemas.openxmlformats.org/drawingml/2006/main" xmlns:r="http://schemas.openxmlformats.org/officeDocument/2006/relationships" xmlns:p="http://schemas.openxmlformats.org/presentationml/2006/main">
-  <p:cSld>
-    <p:spTree>
-      <p:nvGrpSpPr>
-        <p:cNvPr id="1" name=""/>
-        <p:cNvGrpSpPr/>
-        <p:nvPr/>
-      </p:nvGrpSpPr>
-      <p:grpSpPr>
-        <a:xfrm>
-          <a:off x="0" y="0"/>
-          <a:ext cx="0" cy="0"/>
-          <a:chOff x="0" y="0"/>
-          <a:chExt cx="0" cy="0"/>
-        </a:xfrm>
-      </p:grpSpPr>
-      <p:sp>
-        <p:nvSpPr>
-          <p:cNvPr id="2" name="Judul 1">
-            <a:extLst>
-              <a:ext uri="{FF2B5EF4-FFF2-40B4-BE49-F238E27FC236}">
-                <a16:creationId xmlns:a16="http://schemas.microsoft.com/office/drawing/2014/main" id="{3EA23E20-EAA6-4876-8DA1-DFA3583EC802}"/>
-              </a:ext>
-            </a:extLst>
-          </p:cNvPr>
-          <p:cNvSpPr>
-            <a:spLocks noGrp="1"/>
-          </p:cNvSpPr>
-          <p:nvPr>
-            <p:ph type="title"/>
-          </p:nvPr>
-        </p:nvSpPr>
-        <p:spPr>
-          <a:xfrm>
-            <a:off x="658454" y="453981"/>
-            <a:ext cx="8534400" cy="1507067"/>
-          </a:xfrm>
-        </p:spPr>
-        <p:txBody>
-          <a:bodyPr/>
-          <a:lstStyle/>
-          <a:p>
-            <a:r>
-              <a:rPr lang="en-US" dirty="0"/>
               <a:t>Activity Leave</a:t>
             </a:r>
           </a:p>
@@ -6253,7 +6024,7 @@
 </p:sld>
 </file>
 
-<file path=ppt/slides/slide18.xml><?xml version="1.0" encoding="utf-8"?>
+<file path=ppt/slides/slide17.xml><?xml version="1.0" encoding="utf-8"?>
 <p:sld xmlns:a="http://schemas.openxmlformats.org/drawingml/2006/main" xmlns:r="http://schemas.openxmlformats.org/officeDocument/2006/relationships" xmlns:p="http://schemas.openxmlformats.org/presentationml/2006/main">
   <p:cSld>
     <p:spTree>
@@ -6311,6 +6082,129 @@
 </p:sld>
 </file>
 
+<file path=ppt/slides/slide18.xml><?xml version="1.0" encoding="utf-8"?>
+<p:sld xmlns:a="http://schemas.openxmlformats.org/drawingml/2006/main" xmlns:r="http://schemas.openxmlformats.org/officeDocument/2006/relationships" xmlns:p="http://schemas.openxmlformats.org/presentationml/2006/main">
+  <p:cSld>
+    <p:spTree>
+      <p:nvGrpSpPr>
+        <p:cNvPr id="1" name=""/>
+        <p:cNvGrpSpPr/>
+        <p:nvPr/>
+      </p:nvGrpSpPr>
+      <p:grpSpPr>
+        <a:xfrm>
+          <a:off x="0" y="0"/>
+          <a:ext cx="0" cy="0"/>
+          <a:chOff x="0" y="0"/>
+          <a:chExt cx="0" cy="0"/>
+        </a:xfrm>
+      </p:grpSpPr>
+      <p:sp>
+        <p:nvSpPr>
+          <p:cNvPr id="2" name="Judul 1">
+            <a:extLst>
+              <a:ext uri="{FF2B5EF4-FFF2-40B4-BE49-F238E27FC236}">
+                <a16:creationId xmlns:a16="http://schemas.microsoft.com/office/drawing/2014/main" id="{0AD2AB9E-63EE-46E6-BE1E-0199490AC581}"/>
+              </a:ext>
+            </a:extLst>
+          </p:cNvPr>
+          <p:cNvSpPr>
+            <a:spLocks noGrp="1"/>
+          </p:cNvSpPr>
+          <p:nvPr>
+            <p:ph type="title"/>
+          </p:nvPr>
+        </p:nvSpPr>
+        <p:spPr>
+          <a:xfrm>
+            <a:off x="103031" y="41856"/>
+            <a:ext cx="8534400" cy="1507067"/>
+          </a:xfrm>
+        </p:spPr>
+        <p:txBody>
+          <a:bodyPr/>
+          <a:lstStyle/>
+          <a:p>
+            <a:r>
+              <a:rPr lang="en-US" dirty="0"/>
+              <a:t>Activity </a:t>
+            </a:r>
+            <a:r>
+              <a:rPr lang="en-US" dirty="0" err="1"/>
+              <a:t>tambah</a:t>
+            </a:r>
+            <a:r>
+              <a:rPr lang="en-US" dirty="0"/>
+              <a:t> edit </a:t>
+            </a:r>
+            <a:r>
+              <a:rPr lang="en-US" dirty="0" err="1"/>
+              <a:t>hapus</a:t>
+            </a:r>
+            <a:r>
+              <a:rPr lang="en-US" dirty="0"/>
+              <a:t> </a:t>
+            </a:r>
+            <a:r>
+              <a:rPr lang="en-US" dirty="0" err="1"/>
+              <a:t>lihat</a:t>
+            </a:r>
+            <a:r>
+              <a:rPr lang="en-US" dirty="0"/>
+              <a:t> </a:t>
+            </a:r>
+            <a:br>
+              <a:rPr lang="en-US" dirty="0"/>
+            </a:br>
+            <a:r>
+              <a:rPr lang="en-US" dirty="0"/>
+              <a:t>division, position &amp; leave</a:t>
+            </a:r>
+          </a:p>
+        </p:txBody>
+      </p:sp>
+      <p:pic>
+        <p:nvPicPr>
+          <p:cNvPr id="5" name="Tampungan Konten 4">
+            <a:extLst>
+              <a:ext uri="{FF2B5EF4-FFF2-40B4-BE49-F238E27FC236}">
+                <a16:creationId xmlns:a16="http://schemas.microsoft.com/office/drawing/2014/main" id="{4662F4C1-98C6-413F-8101-7AFE723E938B}"/>
+              </a:ext>
+            </a:extLst>
+          </p:cNvPr>
+          <p:cNvPicPr>
+            <a:picLocks noGrp="1" noChangeAspect="1"/>
+          </p:cNvPicPr>
+          <p:nvPr>
+            <p:ph idx="1"/>
+          </p:nvPr>
+        </p:nvPicPr>
+        <p:blipFill>
+          <a:blip r:embed="rId2"/>
+          <a:stretch>
+            <a:fillRect/>
+          </a:stretch>
+        </p:blipFill>
+        <p:spPr>
+          <a:xfrm>
+            <a:off x="3501048" y="1357957"/>
+            <a:ext cx="5189903" cy="5458187"/>
+          </a:xfrm>
+        </p:spPr>
+      </p:pic>
+    </p:spTree>
+    <p:extLst>
+      <p:ext uri="{BB962C8B-B14F-4D97-AF65-F5344CB8AC3E}">
+        <p14:creationId xmlns:p14="http://schemas.microsoft.com/office/powerpoint/2010/main" val="1626780884"/>
+      </p:ext>
+    </p:extLst>
+  </p:cSld>
+  <p:clrMapOvr>
+    <a:masterClrMapping/>
+  </p:clrMapOvr>
+</p:sld>
+</file>
+
 <file path=ppt/slides/slide19.xml><?xml version="1.0" encoding="utf-8"?>
 <p:sld xmlns:a="http://schemas.openxmlformats.org/drawingml/2006/main" xmlns:r="http://schemas.openxmlformats.org/officeDocument/2006/relationships" xmlns:p="http://schemas.openxmlformats.org/presentationml/2006/main">
   <p:cSld>
@@ -6394,10 +6288,10 @@
       </p:sp>
       <p:pic>
         <p:nvPicPr>
-          <p:cNvPr id="5" name="Tampungan Konten 4">
+          <p:cNvPr id="7" name="Tampungan Konten 6">
             <a:extLst>
               <a:ext uri="{FF2B5EF4-FFF2-40B4-BE49-F238E27FC236}">
-                <a16:creationId xmlns:a16="http://schemas.microsoft.com/office/drawing/2014/main" id="{4662F4C1-98C6-413F-8101-7AFE723E938B}"/>
+                <a16:creationId xmlns:a16="http://schemas.microsoft.com/office/drawing/2014/main" id="{F55B7703-6A5B-4C23-80D7-3B2FFB4A27A1}"/>
               </a:ext>
             </a:extLst>
           </p:cNvPr>
@@ -6416,15 +6310,15 @@
         </p:blipFill>
         <p:spPr>
           <a:xfrm>
-            <a:off x="3501048" y="1357957"/>
-            <a:ext cx="5189903" cy="5458187"/>
+            <a:off x="3129373" y="1329743"/>
+            <a:ext cx="5138864" cy="5485200"/>
           </a:xfrm>
         </p:spPr>
       </p:pic>
     </p:spTree>
     <p:extLst>
       <p:ext uri="{BB962C8B-B14F-4D97-AF65-F5344CB8AC3E}">
-        <p14:creationId xmlns:p14="http://schemas.microsoft.com/office/powerpoint/2010/main" val="1626780884"/>
+        <p14:creationId xmlns:p14="http://schemas.microsoft.com/office/powerpoint/2010/main" val="1433996416"/>
       </p:ext>
     </p:extLst>
   </p:cSld>
@@ -6639,7 +6533,7 @@
     </p:spTree>
     <p:extLst>
       <p:ext uri="{BB962C8B-B14F-4D97-AF65-F5344CB8AC3E}">
-        <p14:creationId xmlns:p14="http://schemas.microsoft.com/office/powerpoint/2010/main" val="1433996416"/>
+        <p14:creationId xmlns:p14="http://schemas.microsoft.com/office/powerpoint/2010/main" val="646638184"/>
       </p:ext>
     </p:extLst>
   </p:cSld>
@@ -6732,10 +6626,10 @@
       </p:sp>
       <p:pic>
         <p:nvPicPr>
-          <p:cNvPr id="7" name="Tampungan Konten 6">
+          <p:cNvPr id="6" name="Tampungan Konten 5">
             <a:extLst>
               <a:ext uri="{FF2B5EF4-FFF2-40B4-BE49-F238E27FC236}">
-                <a16:creationId xmlns:a16="http://schemas.microsoft.com/office/drawing/2014/main" id="{F55B7703-6A5B-4C23-80D7-3B2FFB4A27A1}"/>
+                <a16:creationId xmlns:a16="http://schemas.microsoft.com/office/drawing/2014/main" id="{4A9EACA2-5EA7-462B-ABBE-04189DE56DF8}"/>
               </a:ext>
             </a:extLst>
           </p:cNvPr>
@@ -6754,15 +6648,15 @@
         </p:blipFill>
         <p:spPr>
           <a:xfrm>
-            <a:off x="3129373" y="1329743"/>
-            <a:ext cx="5138864" cy="5485200"/>
+            <a:off x="3316487" y="1329744"/>
+            <a:ext cx="4964628" cy="5445374"/>
           </a:xfrm>
         </p:spPr>
       </p:pic>
     </p:spTree>
     <p:extLst>
       <p:ext uri="{BB962C8B-B14F-4D97-AF65-F5344CB8AC3E}">
-        <p14:creationId xmlns:p14="http://schemas.microsoft.com/office/powerpoint/2010/main" val="646638184"/>
+        <p14:creationId xmlns:p14="http://schemas.microsoft.com/office/powerpoint/2010/main" val="1926913022"/>
       </p:ext>
     </p:extLst>
   </p:cSld>
@@ -6855,10 +6749,10 @@
       </p:sp>
       <p:pic>
         <p:nvPicPr>
-          <p:cNvPr id="6" name="Tampungan Konten 5">
+          <p:cNvPr id="7" name="Tampungan Konten 6">
             <a:extLst>
               <a:ext uri="{FF2B5EF4-FFF2-40B4-BE49-F238E27FC236}">
-                <a16:creationId xmlns:a16="http://schemas.microsoft.com/office/drawing/2014/main" id="{4A9EACA2-5EA7-462B-ABBE-04189DE56DF8}"/>
+                <a16:creationId xmlns:a16="http://schemas.microsoft.com/office/drawing/2014/main" id="{BB72C2A3-BFE8-42F6-A1B7-B3589882E534}"/>
               </a:ext>
             </a:extLst>
           </p:cNvPr>
@@ -6877,15 +6771,15 @@
         </p:blipFill>
         <p:spPr>
           <a:xfrm>
-            <a:off x="3316487" y="1329744"/>
-            <a:ext cx="4964628" cy="5445374"/>
+            <a:off x="3319433" y="1355502"/>
+            <a:ext cx="4871530" cy="5437988"/>
           </a:xfrm>
         </p:spPr>
       </p:pic>
     </p:spTree>
     <p:extLst>
       <p:ext uri="{BB962C8B-B14F-4D97-AF65-F5344CB8AC3E}">
-        <p14:creationId xmlns:p14="http://schemas.microsoft.com/office/powerpoint/2010/main" val="1926913022"/>
+        <p14:creationId xmlns:p14="http://schemas.microsoft.com/office/powerpoint/2010/main" val="3478949095"/>
       </p:ext>
     </p:extLst>
   </p:cSld>
@@ -6978,10 +6872,10 @@
       </p:sp>
       <p:pic>
         <p:nvPicPr>
-          <p:cNvPr id="7" name="Tampungan Konten 6">
+          <p:cNvPr id="6" name="Tampungan Konten 5">
             <a:extLst>
               <a:ext uri="{FF2B5EF4-FFF2-40B4-BE49-F238E27FC236}">
-                <a16:creationId xmlns:a16="http://schemas.microsoft.com/office/drawing/2014/main" id="{BB72C2A3-BFE8-42F6-A1B7-B3589882E534}"/>
+                <a16:creationId xmlns:a16="http://schemas.microsoft.com/office/drawing/2014/main" id="{932EFB77-9F85-4755-B03E-925DC1B4FDD9}"/>
               </a:ext>
             </a:extLst>
           </p:cNvPr>
@@ -7000,15 +6894,15 @@
         </p:blipFill>
         <p:spPr>
           <a:xfrm>
-            <a:off x="3319433" y="1355502"/>
-            <a:ext cx="4871530" cy="5437988"/>
+            <a:off x="3325093" y="1355501"/>
+            <a:ext cx="4878749" cy="5421874"/>
           </a:xfrm>
         </p:spPr>
       </p:pic>
     </p:spTree>
     <p:extLst>
       <p:ext uri="{BB962C8B-B14F-4D97-AF65-F5344CB8AC3E}">
-        <p14:creationId xmlns:p14="http://schemas.microsoft.com/office/powerpoint/2010/main" val="3478949095"/>
+        <p14:creationId xmlns:p14="http://schemas.microsoft.com/office/powerpoint/2010/main" val="661896496"/>
       </p:ext>
     </p:extLst>
   </p:cSld>
@@ -7101,10 +6995,10 @@
       </p:sp>
       <p:pic>
         <p:nvPicPr>
-          <p:cNvPr id="6" name="Tampungan Konten 5">
+          <p:cNvPr id="7" name="Tampungan Konten 6">
             <a:extLst>
               <a:ext uri="{FF2B5EF4-FFF2-40B4-BE49-F238E27FC236}">
-                <a16:creationId xmlns:a16="http://schemas.microsoft.com/office/drawing/2014/main" id="{932EFB77-9F85-4755-B03E-925DC1B4FDD9}"/>
+                <a16:creationId xmlns:a16="http://schemas.microsoft.com/office/drawing/2014/main" id="{23233EF0-36AC-4C5B-8CAE-829AE0A16166}"/>
               </a:ext>
             </a:extLst>
           </p:cNvPr>
@@ -7123,15 +7017,15 @@
         </p:blipFill>
         <p:spPr>
           <a:xfrm>
-            <a:off x="3325093" y="1355501"/>
-            <a:ext cx="4878749" cy="5421874"/>
+            <a:off x="3291591" y="1303986"/>
+            <a:ext cx="4860736" cy="5462360"/>
           </a:xfrm>
         </p:spPr>
       </p:pic>
     </p:spTree>
     <p:extLst>
       <p:ext uri="{BB962C8B-B14F-4D97-AF65-F5344CB8AC3E}">
-        <p14:creationId xmlns:p14="http://schemas.microsoft.com/office/powerpoint/2010/main" val="661896496"/>
+        <p14:creationId xmlns:p14="http://schemas.microsoft.com/office/powerpoint/2010/main" val="4008770870"/>
       </p:ext>
     </p:extLst>
   </p:cSld>
@@ -7224,10 +7118,10 @@
       </p:sp>
       <p:pic>
         <p:nvPicPr>
-          <p:cNvPr id="7" name="Tampungan Konten 6">
+          <p:cNvPr id="6" name="Tampungan Konten 5">
             <a:extLst>
               <a:ext uri="{FF2B5EF4-FFF2-40B4-BE49-F238E27FC236}">
-                <a16:creationId xmlns:a16="http://schemas.microsoft.com/office/drawing/2014/main" id="{23233EF0-36AC-4C5B-8CAE-829AE0A16166}"/>
+                <a16:creationId xmlns:a16="http://schemas.microsoft.com/office/drawing/2014/main" id="{DCBFC3F1-29A7-4800-AB68-07E9F80A9A7B}"/>
               </a:ext>
             </a:extLst>
           </p:cNvPr>
@@ -7246,15 +7140,15 @@
         </p:blipFill>
         <p:spPr>
           <a:xfrm>
-            <a:off x="3291591" y="1303986"/>
-            <a:ext cx="4860736" cy="5462360"/>
+            <a:off x="3192688" y="1329744"/>
+            <a:ext cx="5242973" cy="5468074"/>
           </a:xfrm>
         </p:spPr>
       </p:pic>
     </p:spTree>
     <p:extLst>
       <p:ext uri="{BB962C8B-B14F-4D97-AF65-F5344CB8AC3E}">
-        <p14:creationId xmlns:p14="http://schemas.microsoft.com/office/powerpoint/2010/main" val="4008770870"/>
+        <p14:creationId xmlns:p14="http://schemas.microsoft.com/office/powerpoint/2010/main" val="1397618776"/>
       </p:ext>
     </p:extLst>
   </p:cSld>
@@ -7347,10 +7241,10 @@
       </p:sp>
       <p:pic>
         <p:nvPicPr>
-          <p:cNvPr id="6" name="Tampungan Konten 5">
+          <p:cNvPr id="7" name="Tampungan Konten 6">
             <a:extLst>
               <a:ext uri="{FF2B5EF4-FFF2-40B4-BE49-F238E27FC236}">
-                <a16:creationId xmlns:a16="http://schemas.microsoft.com/office/drawing/2014/main" id="{DCBFC3F1-29A7-4800-AB68-07E9F80A9A7B}"/>
+                <a16:creationId xmlns:a16="http://schemas.microsoft.com/office/drawing/2014/main" id="{2BB3DA8B-F700-4BF4-A4A5-0302E18C166F}"/>
               </a:ext>
             </a:extLst>
           </p:cNvPr>
@@ -7369,15 +7263,15 @@
         </p:blipFill>
         <p:spPr>
           <a:xfrm>
-            <a:off x="3192688" y="1329744"/>
-            <a:ext cx="5242973" cy="5468074"/>
+            <a:off x="3323919" y="1342622"/>
+            <a:ext cx="5201895" cy="5432887"/>
           </a:xfrm>
         </p:spPr>
       </p:pic>
     </p:spTree>
     <p:extLst>
       <p:ext uri="{BB962C8B-B14F-4D97-AF65-F5344CB8AC3E}">
-        <p14:creationId xmlns:p14="http://schemas.microsoft.com/office/powerpoint/2010/main" val="1397618776"/>
+        <p14:creationId xmlns:p14="http://schemas.microsoft.com/office/powerpoint/2010/main" val="3485930957"/>
       </p:ext>
     </p:extLst>
   </p:cSld>
@@ -7470,10 +7364,10 @@
       </p:sp>
       <p:pic>
         <p:nvPicPr>
-          <p:cNvPr id="7" name="Tampungan Konten 6">
+          <p:cNvPr id="6" name="Tampungan Konten 5">
             <a:extLst>
               <a:ext uri="{FF2B5EF4-FFF2-40B4-BE49-F238E27FC236}">
-                <a16:creationId xmlns:a16="http://schemas.microsoft.com/office/drawing/2014/main" id="{2BB3DA8B-F700-4BF4-A4A5-0302E18C166F}"/>
+                <a16:creationId xmlns:a16="http://schemas.microsoft.com/office/drawing/2014/main" id="{D003CC0A-4F57-4F9A-9EE4-3900DD2B4A89}"/>
               </a:ext>
             </a:extLst>
           </p:cNvPr>
@@ -7492,15 +7386,15 @@
         </p:blipFill>
         <p:spPr>
           <a:xfrm>
-            <a:off x="3323919" y="1342622"/>
-            <a:ext cx="5201895" cy="5432887"/>
+            <a:off x="3343843" y="1355501"/>
+            <a:ext cx="5130456" cy="5420684"/>
           </a:xfrm>
         </p:spPr>
       </p:pic>
     </p:spTree>
     <p:extLst>
       <p:ext uri="{BB962C8B-B14F-4D97-AF65-F5344CB8AC3E}">
-        <p14:creationId xmlns:p14="http://schemas.microsoft.com/office/powerpoint/2010/main" val="3485930957"/>
+        <p14:creationId xmlns:p14="http://schemas.microsoft.com/office/powerpoint/2010/main" val="2019088104"/>
       </p:ext>
     </p:extLst>
   </p:cSld>
@@ -7593,10 +7487,10 @@
       </p:sp>
       <p:pic>
         <p:nvPicPr>
-          <p:cNvPr id="6" name="Tampungan Konten 5">
+          <p:cNvPr id="7" name="Tampungan Konten 6">
             <a:extLst>
               <a:ext uri="{FF2B5EF4-FFF2-40B4-BE49-F238E27FC236}">
-                <a16:creationId xmlns:a16="http://schemas.microsoft.com/office/drawing/2014/main" id="{D003CC0A-4F57-4F9A-9EE4-3900DD2B4A89}"/>
+                <a16:creationId xmlns:a16="http://schemas.microsoft.com/office/drawing/2014/main" id="{54E637B3-687E-4A33-AA3F-92A4DC26C5EC}"/>
               </a:ext>
             </a:extLst>
           </p:cNvPr>
@@ -7615,15 +7509,15 @@
         </p:blipFill>
         <p:spPr>
           <a:xfrm>
-            <a:off x="3343843" y="1355501"/>
-            <a:ext cx="5130456" cy="5420684"/>
+            <a:off x="2731275" y="1329743"/>
+            <a:ext cx="6489998" cy="5283375"/>
           </a:xfrm>
         </p:spPr>
       </p:pic>
     </p:spTree>
     <p:extLst>
       <p:ext uri="{BB962C8B-B14F-4D97-AF65-F5344CB8AC3E}">
-        <p14:creationId xmlns:p14="http://schemas.microsoft.com/office/powerpoint/2010/main" val="2019088104"/>
+        <p14:creationId xmlns:p14="http://schemas.microsoft.com/office/powerpoint/2010/main" val="1808406207"/>
       </p:ext>
     </p:extLst>
   </p:cSld>
@@ -7716,10 +7610,10 @@
       </p:sp>
       <p:pic>
         <p:nvPicPr>
-          <p:cNvPr id="7" name="Tampungan Konten 6">
+          <p:cNvPr id="6" name="Tampungan Konten 5">
             <a:extLst>
               <a:ext uri="{FF2B5EF4-FFF2-40B4-BE49-F238E27FC236}">
-                <a16:creationId xmlns:a16="http://schemas.microsoft.com/office/drawing/2014/main" id="{54E637B3-687E-4A33-AA3F-92A4DC26C5EC}"/>
+                <a16:creationId xmlns:a16="http://schemas.microsoft.com/office/drawing/2014/main" id="{E8AEC657-C3C5-475C-AA0A-684778486E0B}"/>
               </a:ext>
             </a:extLst>
           </p:cNvPr>
@@ -7738,15 +7632,15 @@
         </p:blipFill>
         <p:spPr>
           <a:xfrm>
-            <a:off x="2731275" y="1329743"/>
-            <a:ext cx="6489998" cy="5283375"/>
+            <a:off x="2677870" y="1419894"/>
+            <a:ext cx="6607797" cy="5313109"/>
           </a:xfrm>
         </p:spPr>
       </p:pic>
     </p:spTree>
     <p:extLst>
       <p:ext uri="{BB962C8B-B14F-4D97-AF65-F5344CB8AC3E}">
-        <p14:creationId xmlns:p14="http://schemas.microsoft.com/office/powerpoint/2010/main" val="1808406207"/>
+        <p14:creationId xmlns:p14="http://schemas.microsoft.com/office/powerpoint/2010/main" val="660677168"/>
       </p:ext>
     </p:extLst>
   </p:cSld>
@@ -7931,10 +7825,10 @@
       </p:sp>
       <p:pic>
         <p:nvPicPr>
-          <p:cNvPr id="6" name="Tampungan Konten 5">
+          <p:cNvPr id="7" name="Tampungan Konten 6">
             <a:extLst>
               <a:ext uri="{FF2B5EF4-FFF2-40B4-BE49-F238E27FC236}">
-                <a16:creationId xmlns:a16="http://schemas.microsoft.com/office/drawing/2014/main" id="{E8AEC657-C3C5-475C-AA0A-684778486E0B}"/>
+                <a16:creationId xmlns:a16="http://schemas.microsoft.com/office/drawing/2014/main" id="{0A75177E-E0A5-4B87-AC18-A1FF05A27C63}"/>
               </a:ext>
             </a:extLst>
           </p:cNvPr>
@@ -7953,15 +7847,15 @@
         </p:blipFill>
         <p:spPr>
           <a:xfrm>
-            <a:off x="2677870" y="1419894"/>
-            <a:ext cx="6607797" cy="5313109"/>
+            <a:off x="2810377" y="1342622"/>
+            <a:ext cx="6385138" cy="5422673"/>
           </a:xfrm>
         </p:spPr>
       </p:pic>
     </p:spTree>
     <p:extLst>
       <p:ext uri="{BB962C8B-B14F-4D97-AF65-F5344CB8AC3E}">
-        <p14:creationId xmlns:p14="http://schemas.microsoft.com/office/powerpoint/2010/main" val="660677168"/>
+        <p14:creationId xmlns:p14="http://schemas.microsoft.com/office/powerpoint/2010/main" val="2183787175"/>
       </p:ext>
     </p:extLst>
   </p:cSld>
@@ -7993,129 +7887,6 @@
           <p:cNvPr id="2" name="Judul 1">
             <a:extLst>
               <a:ext uri="{FF2B5EF4-FFF2-40B4-BE49-F238E27FC236}">
-                <a16:creationId xmlns:a16="http://schemas.microsoft.com/office/drawing/2014/main" id="{0AD2AB9E-63EE-46E6-BE1E-0199490AC581}"/>
-              </a:ext>
-            </a:extLst>
-          </p:cNvPr>
-          <p:cNvSpPr>
-            <a:spLocks noGrp="1"/>
-          </p:cNvSpPr>
-          <p:nvPr>
-            <p:ph type="title"/>
-          </p:nvPr>
-        </p:nvSpPr>
-        <p:spPr>
-          <a:xfrm>
-            <a:off x="103031" y="41856"/>
-            <a:ext cx="8534400" cy="1507067"/>
-          </a:xfrm>
-        </p:spPr>
-        <p:txBody>
-          <a:bodyPr/>
-          <a:lstStyle/>
-          <a:p>
-            <a:r>
-              <a:rPr lang="en-US" dirty="0"/>
-              <a:t>Activity </a:t>
-            </a:r>
-            <a:r>
-              <a:rPr lang="en-US" dirty="0" err="1"/>
-              <a:t>tambah</a:t>
-            </a:r>
-            <a:r>
-              <a:rPr lang="en-US" dirty="0"/>
-              <a:t> edit </a:t>
-            </a:r>
-            <a:r>
-              <a:rPr lang="en-US" dirty="0" err="1"/>
-              <a:t>hapus</a:t>
-            </a:r>
-            <a:r>
-              <a:rPr lang="en-US" dirty="0"/>
-              <a:t> </a:t>
-            </a:r>
-            <a:r>
-              <a:rPr lang="en-US" dirty="0" err="1"/>
-              <a:t>lihat</a:t>
-            </a:r>
-            <a:r>
-              <a:rPr lang="en-US" dirty="0"/>
-              <a:t> </a:t>
-            </a:r>
-            <a:br>
-              <a:rPr lang="en-US" dirty="0"/>
-            </a:br>
-            <a:r>
-              <a:rPr lang="en-US" dirty="0"/>
-              <a:t>division, position &amp; leave</a:t>
-            </a:r>
-          </a:p>
-        </p:txBody>
-      </p:sp>
-      <p:pic>
-        <p:nvPicPr>
-          <p:cNvPr id="7" name="Tampungan Konten 6">
-            <a:extLst>
-              <a:ext uri="{FF2B5EF4-FFF2-40B4-BE49-F238E27FC236}">
-                <a16:creationId xmlns:a16="http://schemas.microsoft.com/office/drawing/2014/main" id="{0A75177E-E0A5-4B87-AC18-A1FF05A27C63}"/>
-              </a:ext>
-            </a:extLst>
-          </p:cNvPr>
-          <p:cNvPicPr>
-            <a:picLocks noGrp="1" noChangeAspect="1"/>
-          </p:cNvPicPr>
-          <p:nvPr>
-            <p:ph idx="1"/>
-          </p:nvPr>
-        </p:nvPicPr>
-        <p:blipFill>
-          <a:blip r:embed="rId2"/>
-          <a:stretch>
-            <a:fillRect/>
-          </a:stretch>
-        </p:blipFill>
-        <p:spPr>
-          <a:xfrm>
-            <a:off x="2810377" y="1342622"/>
-            <a:ext cx="6385138" cy="5422673"/>
-          </a:xfrm>
-        </p:spPr>
-      </p:pic>
-    </p:spTree>
-    <p:extLst>
-      <p:ext uri="{BB962C8B-B14F-4D97-AF65-F5344CB8AC3E}">
-        <p14:creationId xmlns:p14="http://schemas.microsoft.com/office/powerpoint/2010/main" val="2183787175"/>
-      </p:ext>
-    </p:extLst>
-  </p:cSld>
-  <p:clrMapOvr>
-    <a:masterClrMapping/>
-  </p:clrMapOvr>
-</p:sld>
-</file>
-
-<file path=ppt/slides/slide32.xml><?xml version="1.0" encoding="utf-8"?>
-<p:sld xmlns:a="http://schemas.openxmlformats.org/drawingml/2006/main" xmlns:r="http://schemas.openxmlformats.org/officeDocument/2006/relationships" xmlns:p="http://schemas.openxmlformats.org/presentationml/2006/main">
-  <p:cSld>
-    <p:spTree>
-      <p:nvGrpSpPr>
-        <p:cNvPr id="1" name=""/>
-        <p:cNvGrpSpPr/>
-        <p:nvPr/>
-      </p:nvGrpSpPr>
-      <p:grpSpPr>
-        <a:xfrm>
-          <a:off x="0" y="0"/>
-          <a:ext cx="0" cy="0"/>
-          <a:chOff x="0" y="0"/>
-          <a:chExt cx="0" cy="0"/>
-        </a:xfrm>
-      </p:grpSpPr>
-      <p:sp>
-        <p:nvSpPr>
-          <p:cNvPr id="2" name="Judul 1">
-            <a:extLst>
-              <a:ext uri="{FF2B5EF4-FFF2-40B4-BE49-F238E27FC236}">
                 <a16:creationId xmlns:a16="http://schemas.microsoft.com/office/drawing/2014/main" id="{4E30F33D-DE10-4BCD-A85C-1758DF1B365A}"/>
               </a:ext>
             </a:extLst>
@@ -8186,7 +7957,7 @@
 </p:sld>
 </file>
 
-<file path=ppt/slides/slide33.xml><?xml version="1.0" encoding="utf-8"?>
+<file path=ppt/slides/slide32.xml><?xml version="1.0" encoding="utf-8"?>
 <p:sld xmlns:a="http://schemas.openxmlformats.org/drawingml/2006/main" xmlns:r="http://schemas.openxmlformats.org/officeDocument/2006/relationships" xmlns:p="http://schemas.openxmlformats.org/presentationml/2006/main">
   <p:cSld>
     <p:spTree>
@@ -9428,10 +9199,10 @@
       </p:sp>
       <p:pic>
         <p:nvPicPr>
-          <p:cNvPr id="6" name="Tampungan Konten 5">
+          <p:cNvPr id="7" name="Tampungan Konten 6">
             <a:extLst>
               <a:ext uri="{FF2B5EF4-FFF2-40B4-BE49-F238E27FC236}">
-                <a16:creationId xmlns:a16="http://schemas.microsoft.com/office/drawing/2014/main" id="{CE843080-22C5-4B7E-92CA-4D4D57A89119}"/>
+                <a16:creationId xmlns:a16="http://schemas.microsoft.com/office/drawing/2014/main" id="{EB91CF86-1B62-40F3-BBE1-37E2BE639BA3}"/>
               </a:ext>
             </a:extLst>
           </p:cNvPr>
@@ -9450,8 +9221,8 @@
         </p:blipFill>
         <p:spPr>
           <a:xfrm>
-            <a:off x="2023692" y="853225"/>
-            <a:ext cx="9154526" cy="5830909"/>
+            <a:off x="1549066" y="891862"/>
+            <a:ext cx="9093868" cy="5792273"/>
           </a:xfrm>
         </p:spPr>
       </p:pic>
@@ -9871,8 +9642,8 @@
         </p:nvSpPr>
         <p:spPr>
           <a:xfrm>
-            <a:off x="658454" y="453981"/>
-            <a:ext cx="8534400" cy="1507067"/>
+            <a:off x="0" y="-241477"/>
+            <a:ext cx="11306019" cy="1507067"/>
           </a:xfrm>
         </p:spPr>
         <p:txBody>
@@ -9885,15 +9656,23 @@
             </a:r>
             <a:r>
               <a:rPr lang="en-US" dirty="0" err="1"/>
-              <a:t>Lihat</a:t>
-            </a:r>
-            <a:r>
-              <a:rPr lang="en-US" dirty="0"/>
-              <a:t> </a:t>
+              <a:t>Tambah</a:t>
+            </a:r>
+            <a:r>
+              <a:rPr lang="en-US" dirty="0"/>
+              <a:t>, edit, </a:t>
             </a:r>
             <a:r>
               <a:rPr lang="en-US" dirty="0" err="1"/>
-              <a:t>tabel</a:t>
+              <a:t>hapus</a:t>
+            </a:r>
+            <a:r>
+              <a:rPr lang="en-US" dirty="0"/>
+              <a:t>, </a:t>
+            </a:r>
+            <a:r>
+              <a:rPr lang="en-US" dirty="0" err="1"/>
+              <a:t>lihat</a:t>
             </a:r>
             <a:r>
               <a:rPr lang="en-US" dirty="0"/>
@@ -9904,10 +9683,10 @@
       </p:sp>
       <p:pic>
         <p:nvPicPr>
-          <p:cNvPr id="5" name="Tampungan Konten 4">
+          <p:cNvPr id="6" name="Tampungan Konten 5">
             <a:extLst>
               <a:ext uri="{FF2B5EF4-FFF2-40B4-BE49-F238E27FC236}">
-                <a16:creationId xmlns:a16="http://schemas.microsoft.com/office/drawing/2014/main" id="{F0175418-C906-4CDF-9B3C-084B744F5D1E}"/>
+                <a16:creationId xmlns:a16="http://schemas.microsoft.com/office/drawing/2014/main" id="{7987AA05-C0A4-45AA-A079-67F26A754EF6}"/>
               </a:ext>
             </a:extLst>
           </p:cNvPr>
@@ -9926,15 +9705,15 @@
         </p:blipFill>
         <p:spPr>
           <a:xfrm>
-            <a:off x="2253960" y="1632397"/>
-            <a:ext cx="6799888" cy="5099916"/>
+            <a:off x="3248231" y="801709"/>
+            <a:ext cx="5548039" cy="6071052"/>
           </a:xfrm>
         </p:spPr>
       </p:pic>
     </p:spTree>
     <p:extLst>
       <p:ext uri="{BB962C8B-B14F-4D97-AF65-F5344CB8AC3E}">
-        <p14:creationId xmlns:p14="http://schemas.microsoft.com/office/powerpoint/2010/main" val="2994809864"/>
+        <p14:creationId xmlns:p14="http://schemas.microsoft.com/office/powerpoint/2010/main" val="4078357735"/>
       </p:ext>
     </p:extLst>
   </p:cSld>

</xml_diff>